<commit_message>
Changed repostore to servicestore.
</commit_message>
<xml_diff>
--- a/_presentations/Lean1and2-ShahedSahil.pptx
+++ b/_presentations/Lean1and2-ShahedSahil.pptx
@@ -178,7 +178,7 @@
   </p:defaultTextStyle>
   <p:extLst>
     <p:ext uri="{EFAFB233-063F-42B5-8137-9DF3F51BA10A}">
-      <p15:sldGuideLst xmlns:p15="http://schemas.microsoft.com/office/powerpoint/2012/main" xmlns="">
+      <p15:sldGuideLst xmlns="" xmlns:p15="http://schemas.microsoft.com/office/powerpoint/2012/main">
         <p15:guide id="1" orient="horz" pos="2160">
           <p15:clr>
             <a:srgbClr val="A4A3A4"/>
@@ -192,7 +192,7 @@
       </p15:sldGuideLst>
     </p:ext>
     <p:ext uri="{2D200454-40CA-4A62-9FC3-DE9A4176ACB9}">
-      <p15:notesGuideLst xmlns:p15="http://schemas.microsoft.com/office/powerpoint/2012/main" xmlns="">
+      <p15:notesGuideLst xmlns="" xmlns:p15="http://schemas.microsoft.com/office/powerpoint/2012/main">
         <p15:guide id="1" orient="horz" pos="2880">
           <p15:clr>
             <a:srgbClr val="A4A3A4"/>
@@ -10241,19 +10241,19 @@
     </dgm:pt>
   </dgm:ptLst>
   <dgm:cxnLst>
+    <dgm:cxn modelId="{49C93FA5-C4ED-4DC5-9AB2-19815F3521B3}" srcId="{8EB84EAB-7E2F-4C8C-8CAC-E0D6812BA4F1}" destId="{3E9251A7-E671-4243-A46C-975922FEA927}" srcOrd="2" destOrd="0" parTransId="{87779B28-E15C-4244-B47E-C2213DACCBA2}" sibTransId="{38CD6DE7-8E82-4CC3-B3CA-0B21A1D1C98C}"/>
+    <dgm:cxn modelId="{C160CFC8-B760-4082-9C92-8C3CBD83CCF7}" type="presOf" srcId="{35F2417B-042A-441C-B695-AE5212FF4C6D}" destId="{97B45D2C-F9A9-4358-81ED-1DDBD7B759DF}" srcOrd="0" destOrd="0" presId="urn:microsoft.com/office/officeart/2005/8/layout/default"/>
+    <dgm:cxn modelId="{25A4663D-6E17-4BC2-ABD0-4249D09BB37D}" type="presOf" srcId="{C055F35C-295C-407B-A0B8-633DAB5D2631}" destId="{E27049C7-F775-43E9-A27E-15933A2373DE}" srcOrd="0" destOrd="0" presId="urn:microsoft.com/office/officeart/2005/8/layout/default"/>
+    <dgm:cxn modelId="{D48F46C0-34DE-4E52-8D66-B1DF31A05D69}" type="presOf" srcId="{8EB84EAB-7E2F-4C8C-8CAC-E0D6812BA4F1}" destId="{72FC7644-21EF-472C-AA08-7C2F7BE00066}" srcOrd="0" destOrd="0" presId="urn:microsoft.com/office/officeart/2005/8/layout/default"/>
+    <dgm:cxn modelId="{DBA20DC0-47D8-4B44-8592-FBE24A8A5E83}" type="presOf" srcId="{00BED767-45CC-4C36-B6C7-EFE0A5968079}" destId="{3FB7118E-5430-42AB-BE37-5FEABB213110}" srcOrd="0" destOrd="0" presId="urn:microsoft.com/office/officeart/2005/8/layout/default"/>
+    <dgm:cxn modelId="{6C9995D8-233D-4A7F-AD46-CA3A6A58F9A6}" srcId="{8EB84EAB-7E2F-4C8C-8CAC-E0D6812BA4F1}" destId="{483F5628-6B09-41EB-8C27-F31875F60236}" srcOrd="1" destOrd="0" parTransId="{59FCDDFE-32A2-4099-A2CB-623BB2588463}" sibTransId="{2E913BA7-69B9-4EAF-AA0B-41D9BD5E8F03}"/>
+    <dgm:cxn modelId="{7BF7F0BC-02CF-40C8-B5EF-ECBF15F1CAFA}" type="presOf" srcId="{767262DB-D523-4C6E-9BC8-D7C89E43C34D}" destId="{303B9491-3AA5-4555-88A7-A5EB59D9243C}" srcOrd="0" destOrd="0" presId="urn:microsoft.com/office/officeart/2005/8/layout/default"/>
+    <dgm:cxn modelId="{E4BC8316-210E-4EC3-A3DD-11AF5C54A158}" type="presOf" srcId="{483F5628-6B09-41EB-8C27-F31875F60236}" destId="{2E1133D6-042D-4C87-B00A-FA3FF41019A6}" srcOrd="0" destOrd="0" presId="urn:microsoft.com/office/officeart/2005/8/layout/default"/>
+    <dgm:cxn modelId="{76F0EE94-518A-417B-A8A4-50BC470A7E70}" type="presOf" srcId="{3E9251A7-E671-4243-A46C-975922FEA927}" destId="{7B73060C-2499-4F4D-A5AC-A698C125EE2A}" srcOrd="0" destOrd="0" presId="urn:microsoft.com/office/officeart/2005/8/layout/default"/>
     <dgm:cxn modelId="{BBB417D3-A224-4A32-BDAB-2A8939960604}" srcId="{8EB84EAB-7E2F-4C8C-8CAC-E0D6812BA4F1}" destId="{C055F35C-295C-407B-A0B8-633DAB5D2631}" srcOrd="3" destOrd="0" parTransId="{6502E2E9-07A1-45DB-8EC2-E7F131269E7F}" sibTransId="{2943EAA9-BC08-4A1A-B857-7C4F9A38457E}"/>
-    <dgm:cxn modelId="{6C9995D8-233D-4A7F-AD46-CA3A6A58F9A6}" srcId="{8EB84EAB-7E2F-4C8C-8CAC-E0D6812BA4F1}" destId="{483F5628-6B09-41EB-8C27-F31875F60236}" srcOrd="1" destOrd="0" parTransId="{59FCDDFE-32A2-4099-A2CB-623BB2588463}" sibTransId="{2E913BA7-69B9-4EAF-AA0B-41D9BD5E8F03}"/>
-    <dgm:cxn modelId="{76F0EE94-518A-417B-A8A4-50BC470A7E70}" type="presOf" srcId="{3E9251A7-E671-4243-A46C-975922FEA927}" destId="{7B73060C-2499-4F4D-A5AC-A698C125EE2A}" srcOrd="0" destOrd="0" presId="urn:microsoft.com/office/officeart/2005/8/layout/default"/>
+    <dgm:cxn modelId="{E80BF5BB-B168-4727-A8A2-B36FD1707C92}" srcId="{8EB84EAB-7E2F-4C8C-8CAC-E0D6812BA4F1}" destId="{767262DB-D523-4C6E-9BC8-D7C89E43C34D}" srcOrd="5" destOrd="0" parTransId="{3AA52B15-17A8-4B8F-AB98-4C81B499379E}" sibTransId="{8A9798AD-2281-476B-82F8-0E67AA7A2809}"/>
     <dgm:cxn modelId="{CBADCE33-0A1B-4300-AE66-68BD3A0EF7F7}" srcId="{8EB84EAB-7E2F-4C8C-8CAC-E0D6812BA4F1}" destId="{00BED767-45CC-4C36-B6C7-EFE0A5968079}" srcOrd="0" destOrd="0" parTransId="{2B28070D-E976-4C94-8976-92EA6BF8AD69}" sibTransId="{638A2D09-BB1F-4531-9AD4-463D9EC079E2}"/>
-    <dgm:cxn modelId="{D48F46C0-34DE-4E52-8D66-B1DF31A05D69}" type="presOf" srcId="{8EB84EAB-7E2F-4C8C-8CAC-E0D6812BA4F1}" destId="{72FC7644-21EF-472C-AA08-7C2F7BE00066}" srcOrd="0" destOrd="0" presId="urn:microsoft.com/office/officeart/2005/8/layout/default"/>
     <dgm:cxn modelId="{2C956179-7EEF-489B-AE05-59158249ADB3}" srcId="{8EB84EAB-7E2F-4C8C-8CAC-E0D6812BA4F1}" destId="{35F2417B-042A-441C-B695-AE5212FF4C6D}" srcOrd="4" destOrd="0" parTransId="{91B7C815-8359-4BF6-8217-175AEB97F5A5}" sibTransId="{58647C05-28C3-41C2-97E3-DF92D4AD0729}"/>
-    <dgm:cxn modelId="{E4BC8316-210E-4EC3-A3DD-11AF5C54A158}" type="presOf" srcId="{483F5628-6B09-41EB-8C27-F31875F60236}" destId="{2E1133D6-042D-4C87-B00A-FA3FF41019A6}" srcOrd="0" destOrd="0" presId="urn:microsoft.com/office/officeart/2005/8/layout/default"/>
-    <dgm:cxn modelId="{7BF7F0BC-02CF-40C8-B5EF-ECBF15F1CAFA}" type="presOf" srcId="{767262DB-D523-4C6E-9BC8-D7C89E43C34D}" destId="{303B9491-3AA5-4555-88A7-A5EB59D9243C}" srcOrd="0" destOrd="0" presId="urn:microsoft.com/office/officeart/2005/8/layout/default"/>
-    <dgm:cxn modelId="{49C93FA5-C4ED-4DC5-9AB2-19815F3521B3}" srcId="{8EB84EAB-7E2F-4C8C-8CAC-E0D6812BA4F1}" destId="{3E9251A7-E671-4243-A46C-975922FEA927}" srcOrd="2" destOrd="0" parTransId="{87779B28-E15C-4244-B47E-C2213DACCBA2}" sibTransId="{38CD6DE7-8E82-4CC3-B3CA-0B21A1D1C98C}"/>
-    <dgm:cxn modelId="{25A4663D-6E17-4BC2-ABD0-4249D09BB37D}" type="presOf" srcId="{C055F35C-295C-407B-A0B8-633DAB5D2631}" destId="{E27049C7-F775-43E9-A27E-15933A2373DE}" srcOrd="0" destOrd="0" presId="urn:microsoft.com/office/officeart/2005/8/layout/default"/>
-    <dgm:cxn modelId="{E80BF5BB-B168-4727-A8A2-B36FD1707C92}" srcId="{8EB84EAB-7E2F-4C8C-8CAC-E0D6812BA4F1}" destId="{767262DB-D523-4C6E-9BC8-D7C89E43C34D}" srcOrd="5" destOrd="0" parTransId="{3AA52B15-17A8-4B8F-AB98-4C81B499379E}" sibTransId="{8A9798AD-2281-476B-82F8-0E67AA7A2809}"/>
-    <dgm:cxn modelId="{C160CFC8-B760-4082-9C92-8C3CBD83CCF7}" type="presOf" srcId="{35F2417B-042A-441C-B695-AE5212FF4C6D}" destId="{97B45D2C-F9A9-4358-81ED-1DDBD7B759DF}" srcOrd="0" destOrd="0" presId="urn:microsoft.com/office/officeart/2005/8/layout/default"/>
-    <dgm:cxn modelId="{DBA20DC0-47D8-4B44-8592-FBE24A8A5E83}" type="presOf" srcId="{00BED767-45CC-4C36-B6C7-EFE0A5968079}" destId="{3FB7118E-5430-42AB-BE37-5FEABB213110}" srcOrd="0" destOrd="0" presId="urn:microsoft.com/office/officeart/2005/8/layout/default"/>
     <dgm:cxn modelId="{AA4A8FB0-30B8-46ED-B392-C271A9CCBD19}" type="presParOf" srcId="{72FC7644-21EF-472C-AA08-7C2F7BE00066}" destId="{3FB7118E-5430-42AB-BE37-5FEABB213110}" srcOrd="0" destOrd="0" presId="urn:microsoft.com/office/officeart/2005/8/layout/default"/>
     <dgm:cxn modelId="{E4BD54B9-BD09-4340-830E-756966E46CDB}" type="presParOf" srcId="{72FC7644-21EF-472C-AA08-7C2F7BE00066}" destId="{1AC34112-308B-4528-BECD-3EC553FD5232}" srcOrd="1" destOrd="0" presId="urn:microsoft.com/office/officeart/2005/8/layout/default"/>
     <dgm:cxn modelId="{558D0B9B-B369-4660-A111-6652E0C1BD50}" type="presParOf" srcId="{72FC7644-21EF-472C-AA08-7C2F7BE00066}" destId="{2E1133D6-042D-4C87-B00A-FA3FF41019A6}" srcOrd="2" destOrd="0" presId="urn:microsoft.com/office/officeart/2005/8/layout/default"/>
@@ -29660,7 +29660,7 @@
           <a:p>
             <a:fld id="{F9C02A71-BF6E-46ED-A654-898E91E44798}" type="datetimeFigureOut">
               <a:rPr lang="en-US" smtClean="0"/>
-              <a:t>4/20/2013</a:t>
+              <a:t>4/21/2013</a:t>
             </a:fld>
             <a:endParaRPr lang="en-US"/>
           </a:p>
@@ -34869,7 +34869,7 @@
           <a:p>
             <a:fld id="{2A8952F3-850D-43B5-8EAB-46809C6C734A}" type="datetimeFigureOut">
               <a:rPr lang="en-US" smtClean="0"/>
-              <a:t>4/20/2013</a:t>
+              <a:t>4/21/2013</a:t>
             </a:fld>
             <a:endParaRPr lang="en-US"/>
           </a:p>
@@ -48747,8 +48747,8 @@
                 </a:spcAft>
               </a:pPr>
               <a:r>
-                <a:rPr lang="en-US" kern="1200" dirty="0" smtClean="0"/>
-                <a:t>RepositoryStore</a:t>
+                <a:rPr lang="en-US" kern="1200" dirty="0" err="1" smtClean="0"/>
+                <a:t>ServiceStore</a:t>
               </a:r>
               <a:endParaRPr lang="en-US" kern="1200" dirty="0"/>
             </a:p>
@@ -48763,7 +48763,7 @@
         </p:nvGrpSpPr>
         <p:grpSpPr>
           <a:xfrm>
-            <a:off x="542226" y="-167425"/>
+            <a:off x="542226" y="-239952"/>
             <a:ext cx="8163026" cy="5501425"/>
             <a:chOff x="3132" y="299104"/>
             <a:chExt cx="8297948" cy="2005480"/>
@@ -49522,7 +49522,7 @@
       </p:sp>
       <p:sp>
         <p:nvSpPr>
-          <p:cNvPr id="27" name="Rounded Rectangle 26"/>
+          <p:cNvPr id="27" name="Rounded Rectangle 26" hidden="1"/>
           <p:cNvSpPr/>
           <p:nvPr/>
         </p:nvSpPr>
@@ -55725,7 +55725,7 @@
   </a:extraClrSchemeLst>
   <a:extLst>
     <a:ext uri="{05A4C25C-085E-4340-85A3-A5531E510DB2}">
-      <thm15:themeFamily xmlns:thm15="http://schemas.microsoft.com/office/thememl/2012/main" xmlns="" name="Excella" id="{9A5F6432-036B-4B94-AD11-BE20D0494622}" vid="{7466CE9E-D5DB-4024-BB33-EA4F022184C8}"/>
+      <thm15:themeFamily xmlns="" xmlns:thm15="http://schemas.microsoft.com/office/thememl/2012/main" name="Excella" id="{9A5F6432-036B-4B94-AD11-BE20D0494622}" vid="{7466CE9E-D5DB-4024-BB33-EA4F022184C8}"/>
     </a:ext>
   </a:extLst>
 </a:theme>

</xml_diff>